<commit_message>
mise en place de la BDD
</commit_message>
<xml_diff>
--- a/Layout.pptx
+++ b/Layout.pptx
@@ -8,6 +8,7 @@
     <p:sldId id="257" r:id="rId2"/>
     <p:sldId id="258" r:id="rId3"/>
     <p:sldId id="259" r:id="rId4"/>
+    <p:sldId id="260" r:id="rId5"/>
   </p:sldIdLst>
   <p:sldSz cx="12192000" cy="6858000"/>
   <p:notesSz cx="6858000" cy="9144000"/>
@@ -106,6 +107,11 @@
       </a:defRPr>
     </a:lvl9pPr>
   </p:defaultTextStyle>
+  <p:extLst>
+    <p:ext uri="{EFAFB233-063F-42B5-8137-9DF3F51BA10A}">
+      <p15:sldGuideLst xmlns:p15="http://schemas.microsoft.com/office/powerpoint/2012/main"/>
+    </p:ext>
+  </p:extLst>
 </p:presentation>
 </file>
 
@@ -256,7 +262,7 @@
           <a:p>
             <a:fld id="{9D561800-0FB4-418E-BB31-04833C8C7336}" type="datetimeFigureOut">
               <a:rPr lang="fr-FR" smtClean="0"/>
-              <a:t>26/12/2018</a:t>
+              <a:t>04/01/2019</a:t>
             </a:fld>
             <a:endParaRPr lang="fr-FR"/>
           </a:p>
@@ -454,7 +460,7 @@
           <a:p>
             <a:fld id="{9D561800-0FB4-418E-BB31-04833C8C7336}" type="datetimeFigureOut">
               <a:rPr lang="fr-FR" smtClean="0"/>
-              <a:t>26/12/2018</a:t>
+              <a:t>04/01/2019</a:t>
             </a:fld>
             <a:endParaRPr lang="fr-FR"/>
           </a:p>
@@ -662,7 +668,7 @@
           <a:p>
             <a:fld id="{9D561800-0FB4-418E-BB31-04833C8C7336}" type="datetimeFigureOut">
               <a:rPr lang="fr-FR" smtClean="0"/>
-              <a:t>26/12/2018</a:t>
+              <a:t>04/01/2019</a:t>
             </a:fld>
             <a:endParaRPr lang="fr-FR"/>
           </a:p>
@@ -860,7 +866,7 @@
           <a:p>
             <a:fld id="{9D561800-0FB4-418E-BB31-04833C8C7336}" type="datetimeFigureOut">
               <a:rPr lang="fr-FR" smtClean="0"/>
-              <a:t>26/12/2018</a:t>
+              <a:t>04/01/2019</a:t>
             </a:fld>
             <a:endParaRPr lang="fr-FR"/>
           </a:p>
@@ -1135,7 +1141,7 @@
           <a:p>
             <a:fld id="{9D561800-0FB4-418E-BB31-04833C8C7336}" type="datetimeFigureOut">
               <a:rPr lang="fr-FR" smtClean="0"/>
-              <a:t>26/12/2018</a:t>
+              <a:t>04/01/2019</a:t>
             </a:fld>
             <a:endParaRPr lang="fr-FR"/>
           </a:p>
@@ -1400,7 +1406,7 @@
           <a:p>
             <a:fld id="{9D561800-0FB4-418E-BB31-04833C8C7336}" type="datetimeFigureOut">
               <a:rPr lang="fr-FR" smtClean="0"/>
-              <a:t>26/12/2018</a:t>
+              <a:t>04/01/2019</a:t>
             </a:fld>
             <a:endParaRPr lang="fr-FR"/>
           </a:p>
@@ -1812,7 +1818,7 @@
           <a:p>
             <a:fld id="{9D561800-0FB4-418E-BB31-04833C8C7336}" type="datetimeFigureOut">
               <a:rPr lang="fr-FR" smtClean="0"/>
-              <a:t>26/12/2018</a:t>
+              <a:t>04/01/2019</a:t>
             </a:fld>
             <a:endParaRPr lang="fr-FR"/>
           </a:p>
@@ -1953,7 +1959,7 @@
           <a:p>
             <a:fld id="{9D561800-0FB4-418E-BB31-04833C8C7336}" type="datetimeFigureOut">
               <a:rPr lang="fr-FR" smtClean="0"/>
-              <a:t>26/12/2018</a:t>
+              <a:t>04/01/2019</a:t>
             </a:fld>
             <a:endParaRPr lang="fr-FR"/>
           </a:p>
@@ -2066,7 +2072,7 @@
           <a:p>
             <a:fld id="{9D561800-0FB4-418E-BB31-04833C8C7336}" type="datetimeFigureOut">
               <a:rPr lang="fr-FR" smtClean="0"/>
-              <a:t>26/12/2018</a:t>
+              <a:t>04/01/2019</a:t>
             </a:fld>
             <a:endParaRPr lang="fr-FR"/>
           </a:p>
@@ -2377,7 +2383,7 @@
           <a:p>
             <a:fld id="{9D561800-0FB4-418E-BB31-04833C8C7336}" type="datetimeFigureOut">
               <a:rPr lang="fr-FR" smtClean="0"/>
-              <a:t>26/12/2018</a:t>
+              <a:t>04/01/2019</a:t>
             </a:fld>
             <a:endParaRPr lang="fr-FR"/>
           </a:p>
@@ -2665,7 +2671,7 @@
           <a:p>
             <a:fld id="{9D561800-0FB4-418E-BB31-04833C8C7336}" type="datetimeFigureOut">
               <a:rPr lang="fr-FR" smtClean="0"/>
-              <a:t>26/12/2018</a:t>
+              <a:t>04/01/2019</a:t>
             </a:fld>
             <a:endParaRPr lang="fr-FR"/>
           </a:p>
@@ -2906,7 +2912,7 @@
           <a:p>
             <a:fld id="{9D561800-0FB4-418E-BB31-04833C8C7336}" type="datetimeFigureOut">
               <a:rPr lang="fr-FR" smtClean="0"/>
-              <a:t>26/12/2018</a:t>
+              <a:t>04/01/2019</a:t>
             </a:fld>
             <a:endParaRPr lang="fr-FR"/>
           </a:p>
@@ -4904,6 +4910,128 @@
 </p:sld>
 </file>
 
+<file path=ppt/slides/slide4.xml><?xml version="1.0" encoding="utf-8"?>
+<p:sld xmlns:a="http://schemas.openxmlformats.org/drawingml/2006/main" xmlns:r="http://schemas.openxmlformats.org/officeDocument/2006/relationships" xmlns:p="http://schemas.openxmlformats.org/presentationml/2006/main">
+  <p:cSld>
+    <p:spTree>
+      <p:nvGrpSpPr>
+        <p:cNvPr id="1" name=""/>
+        <p:cNvGrpSpPr/>
+        <p:nvPr/>
+      </p:nvGrpSpPr>
+      <p:grpSpPr>
+        <a:xfrm>
+          <a:off x="0" y="0"/>
+          <a:ext cx="0" cy="0"/>
+          <a:chOff x="0" y="0"/>
+          <a:chExt cx="0" cy="0"/>
+        </a:xfrm>
+      </p:grpSpPr>
+      <p:sp>
+        <p:nvSpPr>
+          <p:cNvPr id="2" name="Titre 1">
+            <a:extLst>
+              <a:ext uri="{FF2B5EF4-FFF2-40B4-BE49-F238E27FC236}">
+                <a16:creationId xmlns:a16="http://schemas.microsoft.com/office/drawing/2014/main" id="{10C5E3C2-A6B7-459E-BAEC-C287EC8DB5A3}"/>
+              </a:ext>
+            </a:extLst>
+          </p:cNvPr>
+          <p:cNvSpPr>
+            <a:spLocks noGrp="1"/>
+          </p:cNvSpPr>
+          <p:nvPr>
+            <p:ph type="title"/>
+          </p:nvPr>
+        </p:nvSpPr>
+        <p:spPr/>
+        <p:txBody>
+          <a:bodyPr/>
+          <a:lstStyle/>
+          <a:p>
+            <a:r>
+              <a:rPr lang="fr-FR" dirty="0"/>
+              <a:t>Format d’un objet annonce dans la BDD</a:t>
+            </a:r>
+          </a:p>
+        </p:txBody>
+      </p:sp>
+      <p:sp>
+        <p:nvSpPr>
+          <p:cNvPr id="3" name="Espace réservé du contenu 2">
+            <a:extLst>
+              <a:ext uri="{FF2B5EF4-FFF2-40B4-BE49-F238E27FC236}">
+                <a16:creationId xmlns:a16="http://schemas.microsoft.com/office/drawing/2014/main" id="{8C16962A-941B-4FCD-8224-6F97011CBD9F}"/>
+              </a:ext>
+            </a:extLst>
+          </p:cNvPr>
+          <p:cNvSpPr>
+            <a:spLocks noGrp="1"/>
+          </p:cNvSpPr>
+          <p:nvPr>
+            <p:ph idx="1"/>
+          </p:nvPr>
+        </p:nvSpPr>
+        <p:spPr/>
+        <p:txBody>
+          <a:bodyPr/>
+          <a:lstStyle/>
+          <a:p>
+            <a:r>
+              <a:rPr lang="fr-FR" dirty="0"/>
+              <a:t>Id</a:t>
+            </a:r>
+          </a:p>
+          <a:p>
+            <a:r>
+              <a:rPr lang="fr-FR" dirty="0" err="1"/>
+              <a:t>author</a:t>
+            </a:r>
+            <a:endParaRPr lang="fr-FR" dirty="0"/>
+          </a:p>
+          <a:p>
+            <a:r>
+              <a:rPr lang="fr-FR" dirty="0"/>
+              <a:t>Type</a:t>
+            </a:r>
+          </a:p>
+          <a:p>
+            <a:r>
+              <a:rPr lang="fr-FR"/>
+              <a:t>reward</a:t>
+            </a:r>
+            <a:endParaRPr lang="fr-FR" dirty="0"/>
+          </a:p>
+          <a:p>
+            <a:r>
+              <a:rPr lang="fr-FR" dirty="0" err="1"/>
+              <a:t>title</a:t>
+            </a:r>
+            <a:endParaRPr lang="fr-FR" dirty="0"/>
+          </a:p>
+          <a:p>
+            <a:r>
+              <a:rPr lang="fr-FR" dirty="0"/>
+              <a:t>description</a:t>
+            </a:r>
+          </a:p>
+          <a:p>
+            <a:endParaRPr lang="fr-FR" dirty="0"/>
+          </a:p>
+        </p:txBody>
+      </p:sp>
+    </p:spTree>
+    <p:extLst>
+      <p:ext uri="{BB962C8B-B14F-4D97-AF65-F5344CB8AC3E}">
+        <p14:creationId xmlns:p14="http://schemas.microsoft.com/office/powerpoint/2010/main" val="2460630848"/>
+      </p:ext>
+    </p:extLst>
+  </p:cSld>
+  <p:clrMapOvr>
+    <a:masterClrMapping/>
+  </p:clrMapOvr>
+</p:sld>
+</file>
+
 <file path=ppt/theme/theme1.xml><?xml version="1.0" encoding="utf-8"?>
 <a:theme xmlns:a="http://schemas.openxmlformats.org/drawingml/2006/main" name="Thème Office">
   <a:themeElements>

</xml_diff>